<commit_message>
Hospital GN2 Entire Project Update
Entire project including all updates to date in zip folder

Co-Authored-By: naqashb7 <79805483+naqashb7@users.noreply.github.com>
Co-Authored-By: georgejnrr <84009339+georgejnrr@users.noreply.github.com>
</commit_message>
<xml_diff>
--- a/Hospital Management Designv2.pptx
+++ b/Hospital Management Designv2.pptx
@@ -5066,7 +5066,7 @@
           <p:nvPr>
             <p:extLst>
               <p:ext uri="{D42A27DB-BD31-4B8C-83A1-F6EECF244321}">
-                <p14:modId xmlns:p14="http://schemas.microsoft.com/office/powerpoint/2010/main" val="606610643"/>
+                <p14:modId xmlns:p14="http://schemas.microsoft.com/office/powerpoint/2010/main" val="4045907728"/>
               </p:ext>
             </p:extLst>
           </p:nvPr>
@@ -5158,7 +5158,7 @@
                     <a:p>
                       <a:r>
                         <a:rPr lang="en-US" sz="1200" dirty="0"/>
-                        <a:t>problem</a:t>
+                        <a:t>Problem</a:t>
                       </a:r>
                     </a:p>
                   </a:txBody>
@@ -5263,7 +5263,7 @@
             <a:pPr algn="ctr"/>
             <a:r>
               <a:rPr lang="en-US" dirty="0"/>
-              <a:t>Prescribe Treatment</a:t>
+              <a:t>Prescribe Medicine</a:t>
             </a:r>
           </a:p>
         </p:txBody>
@@ -5610,7 +5610,7 @@
           <a:p>
             <a:r>
               <a:rPr lang="en-US" dirty="0"/>
-              <a:t>Display record</a:t>
+              <a:t>Patient Records</a:t>
             </a:r>
           </a:p>
           <a:p>
@@ -5786,7 +5786,7 @@
           <a:p>
             <a:r>
               <a:rPr lang="en-US" dirty="0"/>
-              <a:t>Treatment </a:t>
+              <a:t>Patient Records </a:t>
             </a:r>
             <a:r>
               <a:rPr lang="en-US" dirty="0">
@@ -5829,8 +5829,8 @@
         </p:nvSpPr>
         <p:spPr>
           <a:xfrm>
-            <a:off x="0" y="1914483"/>
-            <a:ext cx="2646465" cy="993383"/>
+            <a:off x="80395" y="1979588"/>
+            <a:ext cx="2497520" cy="993383"/>
           </a:xfrm>
           <a:prstGeom prst="roundRect">
             <a:avLst/>
@@ -5857,7 +5857,7 @@
             <a:pPr algn="ctr"/>
             <a:r>
               <a:rPr lang="en-US" sz="1600" dirty="0" err="1"/>
-              <a:t>DisplayRecord.java</a:t>
+              <a:t>displayRecord.jsp</a:t>
             </a:r>
             <a:r>
               <a:rPr lang="en-US" sz="1600" dirty="0"/>
@@ -5875,71 +5875,16 @@
               <a:t> created</a:t>
             </a:r>
           </a:p>
-        </p:txBody>
-      </p:sp>
-      <p:sp>
-        <p:nvSpPr>
-          <p:cNvPr id="23" name="Rounded Rectangle 22">
-            <a:extLst>
-              <a:ext uri="{FF2B5EF4-FFF2-40B4-BE49-F238E27FC236}">
-                <a16:creationId xmlns:a16="http://schemas.microsoft.com/office/drawing/2014/main" id="{7F7D9FEF-CA9F-A449-B796-21378A1A7FB9}"/>
-              </a:ext>
-            </a:extLst>
-          </p:cNvPr>
-          <p:cNvSpPr/>
-          <p:nvPr/>
-        </p:nvSpPr>
-        <p:spPr>
-          <a:xfrm>
-            <a:off x="80395" y="3143026"/>
-            <a:ext cx="2473354" cy="744345"/>
-          </a:xfrm>
-          <a:prstGeom prst="roundRect">
-            <a:avLst/>
-          </a:prstGeom>
-        </p:spPr>
-        <p:style>
-          <a:lnRef idx="2">
-            <a:schemeClr val="accent2">
-              <a:shade val="50000"/>
-            </a:schemeClr>
-          </a:lnRef>
-          <a:fillRef idx="1">
-            <a:schemeClr val="accent2"/>
-          </a:fillRef>
-          <a:effectRef idx="0">
-            <a:schemeClr val="accent2"/>
-          </a:effectRef>
-          <a:fontRef idx="minor">
-            <a:schemeClr val="lt1"/>
-          </a:fontRef>
-        </p:style>
-        <p:txBody>
-          <a:bodyPr rtlCol="0" anchor="ctr"/>
-          <a:lstStyle/>
           <a:p>
             <a:pPr algn="ctr"/>
-            <a:r>
-              <a:rPr lang="en-US" sz="1600" dirty="0"/>
-              <a:t>Create </a:t>
-            </a:r>
-            <a:r>
-              <a:rPr lang="en-US" sz="1600" dirty="0" err="1"/>
-              <a:t>displayRecordServlet.java</a:t>
-            </a:r>
-            <a:endParaRPr lang="en-US" sz="1600" dirty="0"/>
-          </a:p>
-          <a:p>
-            <a:pPr algn="ctr"/>
-            <a:r>
-              <a:rPr lang="en-US" sz="1600" dirty="0"/>
-              <a:t>Create </a:t>
-            </a:r>
             <a:r>
               <a:rPr lang="en-US" sz="1600" dirty="0" err="1"/>
               <a:t>RecordQuery.java</a:t>
             </a:r>
-            <a:endParaRPr lang="en-US" sz="1600" dirty="0"/>
+            <a:r>
+              <a:rPr lang="en-US" sz="1600" dirty="0"/>
+              <a:t> created</a:t>
+            </a:r>
           </a:p>
         </p:txBody>
       </p:sp>
@@ -6020,14 +5965,14 @@
           <p:nvPr>
             <p:extLst>
               <p:ext uri="{D42A27DB-BD31-4B8C-83A1-F6EECF244321}">
-                <p14:modId xmlns:p14="http://schemas.microsoft.com/office/powerpoint/2010/main" val="4051170557"/>
+                <p14:modId xmlns:p14="http://schemas.microsoft.com/office/powerpoint/2010/main" val="1616759251"/>
               </p:ext>
             </p:extLst>
           </p:nvPr>
         </p:nvGraphicFramePr>
         <p:xfrm>
-          <a:off x="3434794" y="2640123"/>
-          <a:ext cx="6533973" cy="2041938"/>
+          <a:off x="3381812" y="2675899"/>
+          <a:ext cx="6586952" cy="2224818"/>
         </p:xfrm>
         <a:graphic>
           <a:graphicData uri="http://schemas.openxmlformats.org/drawingml/2006/table">
@@ -6036,56 +5981,56 @@
                 <a:tableStyleId>{F5AB1C69-6EDB-4FF4-983F-18BD219EF322}</a:tableStyleId>
               </a:tblPr>
               <a:tblGrid>
-                <a:gridCol w="769791">
+                <a:gridCol w="785059">
+                  <a:extLst>
+                    <a:ext uri="{9D8B030D-6E8A-4147-A177-3AD203B41FA5}">
+                      <a16:colId xmlns:a16="http://schemas.microsoft.com/office/drawing/2014/main" val="4070653356"/>
+                    </a:ext>
+                  </a:extLst>
+                </a:gridCol>
+                <a:gridCol w="785059">
                   <a:extLst>
                     <a:ext uri="{9D8B030D-6E8A-4147-A177-3AD203B41FA5}">
                       <a16:colId xmlns:a16="http://schemas.microsoft.com/office/drawing/2014/main" val="484706619"/>
                     </a:ext>
                   </a:extLst>
                 </a:gridCol>
-                <a:gridCol w="769791">
+                <a:gridCol w="785059">
                   <a:extLst>
                     <a:ext uri="{9D8B030D-6E8A-4147-A177-3AD203B41FA5}">
                       <a16:colId xmlns:a16="http://schemas.microsoft.com/office/drawing/2014/main" val="82939911"/>
                     </a:ext>
                   </a:extLst>
                 </a:gridCol>
-                <a:gridCol w="769791">
+                <a:gridCol w="785059">
                   <a:extLst>
                     <a:ext uri="{9D8B030D-6E8A-4147-A177-3AD203B41FA5}">
                       <a16:colId xmlns:a16="http://schemas.microsoft.com/office/drawing/2014/main" val="930562621"/>
                     </a:ext>
                   </a:extLst>
                 </a:gridCol>
-                <a:gridCol w="844920">
+                <a:gridCol w="861679">
                   <a:extLst>
                     <a:ext uri="{9D8B030D-6E8A-4147-A177-3AD203B41FA5}">
                       <a16:colId xmlns:a16="http://schemas.microsoft.com/office/drawing/2014/main" val="2014208457"/>
                     </a:ext>
                   </a:extLst>
                 </a:gridCol>
-                <a:gridCol w="844920">
-                  <a:extLst>
-                    <a:ext uri="{9D8B030D-6E8A-4147-A177-3AD203B41FA5}">
-                      <a16:colId xmlns:a16="http://schemas.microsoft.com/office/drawing/2014/main" val="3258648409"/>
-                    </a:ext>
-                  </a:extLst>
-                </a:gridCol>
-                <a:gridCol w="844920">
+                <a:gridCol w="861679">
                   <a:extLst>
                     <a:ext uri="{9D8B030D-6E8A-4147-A177-3AD203B41FA5}">
                       <a16:colId xmlns:a16="http://schemas.microsoft.com/office/drawing/2014/main" val="1376025209"/>
                     </a:ext>
                   </a:extLst>
                 </a:gridCol>
-                <a:gridCol w="844920">
+                <a:gridCol w="861679">
                   <a:extLst>
                     <a:ext uri="{9D8B030D-6E8A-4147-A177-3AD203B41FA5}">
                       <a16:colId xmlns:a16="http://schemas.microsoft.com/office/drawing/2014/main" val="1612898172"/>
                     </a:ext>
                   </a:extLst>
                 </a:gridCol>
-                <a:gridCol w="844920">
+                <a:gridCol w="861679">
                   <a:extLst>
                     <a:ext uri="{9D8B030D-6E8A-4147-A177-3AD203B41FA5}">
                       <a16:colId xmlns:a16="http://schemas.microsoft.com/office/drawing/2014/main" val="2707565655"/>
@@ -6094,6 +6039,25 @@
                 </a:gridCol>
               </a:tblGrid>
               <a:tr h="225051">
+                <a:tc>
+                  <a:txBody>
+                    <a:bodyPr/>
+                    <a:lstStyle/>
+                    <a:p>
+                      <a:r>
+                        <a:rPr lang="en-US" sz="1200" dirty="0"/>
+                        <a:t>Treat</a:t>
+                      </a:r>
+                    </a:p>
+                    <a:p>
+                      <a:r>
+                        <a:rPr lang="en-US" sz="1200" dirty="0"/>
+                        <a:t>(record #)</a:t>
+                      </a:r>
+                    </a:p>
+                  </a:txBody>
+                  <a:tcPr/>
+                </a:tc>
                 <a:tc>
                   <a:txBody>
                     <a:bodyPr/>
@@ -6153,19 +6117,6 @@
                     <a:p>
                       <a:r>
                         <a:rPr lang="en-US" sz="1200" dirty="0"/>
-                        <a:t>Booking Date?</a:t>
-                      </a:r>
-                    </a:p>
-                  </a:txBody>
-                  <a:tcPr/>
-                </a:tc>
-                <a:tc>
-                  <a:txBody>
-                    <a:bodyPr/>
-                    <a:lstStyle/>
-                    <a:p>
-                      <a:r>
-                        <a:rPr lang="en-US" sz="1200" dirty="0"/>
                         <a:t>Doctor</a:t>
                       </a:r>
                     </a:p>
@@ -6179,7 +6130,7 @@
                     <a:p>
                       <a:r>
                         <a:rPr lang="en-US" sz="1200" dirty="0"/>
-                        <a:t>Treatment</a:t>
+                        <a:t>Medicine</a:t>
                       </a:r>
                     </a:p>
                   </a:txBody>
@@ -6210,7 +6161,10 @@
                     <a:bodyPr/>
                     <a:lstStyle/>
                     <a:p>
-                      <a:endParaRPr lang="en-US" sz="1200" dirty="0"/>
+                      <a:r>
+                        <a:rPr lang="en-US" sz="1200" dirty="0"/>
+                        <a:t>1</a:t>
+                      </a:r>
                     </a:p>
                   </a:txBody>
                   <a:tcPr/>
@@ -6297,7 +6251,10 @@
                     <a:bodyPr/>
                     <a:lstStyle/>
                     <a:p>
-                      <a:endParaRPr lang="en-US" sz="1200" dirty="0"/>
+                      <a:r>
+                        <a:rPr lang="en-US" sz="1200" dirty="0"/>
+                        <a:t>2</a:t>
+                      </a:r>
                     </a:p>
                   </a:txBody>
                   <a:tcPr/>
@@ -6387,7 +6344,10 @@
                     <a:bodyPr/>
                     <a:lstStyle/>
                     <a:p>
-                      <a:endParaRPr lang="en-US" sz="1200" dirty="0"/>
+                      <a:r>
+                        <a:rPr lang="en-US" sz="1200" dirty="0"/>
+                        <a:t>3</a:t>
+                      </a:r>
                     </a:p>
                   </a:txBody>
                   <a:tcPr/>
@@ -6534,17 +6494,17 @@
             </a:r>
             <a:r>
               <a:rPr lang="en-US" dirty="0"/>
-              <a:t>(consultation</a:t>
+              <a:t>(consultation)</a:t>
             </a:r>
           </a:p>
         </p:txBody>
       </p:sp>
       <p:pic>
         <p:nvPicPr>
-          <p:cNvPr id="27" name="Graphic 26" descr="Construction Barricade with solid fill">
-            <a:extLst>
-              <a:ext uri="{FF2B5EF4-FFF2-40B4-BE49-F238E27FC236}">
-                <a16:creationId xmlns:a16="http://schemas.microsoft.com/office/drawing/2014/main" id="{FB152512-C284-6F4B-BC3F-0ED1E0974631}"/>
+          <p:cNvPr id="17" name="Graphic 16" descr="Shield Tick with solid fill">
+            <a:extLst>
+              <a:ext uri="{FF2B5EF4-FFF2-40B4-BE49-F238E27FC236}">
+                <a16:creationId xmlns:a16="http://schemas.microsoft.com/office/drawing/2014/main" id="{02EE0EDB-75F3-F74F-B256-FEB0C3710D7B}"/>
               </a:ext>
             </a:extLst>
           </p:cNvPr>
@@ -6567,7 +6527,7 @@
         </p:blipFill>
         <p:spPr>
           <a:xfrm>
-            <a:off x="11130793" y="3049017"/>
+            <a:off x="11197205" y="2972971"/>
             <a:ext cx="914400" cy="914400"/>
           </a:xfrm>
           <a:prstGeom prst="rect">
@@ -6776,7 +6736,7 @@
         </p:nvSpPr>
         <p:spPr>
           <a:xfrm>
-            <a:off x="4769140" y="2821768"/>
+            <a:off x="4949504" y="3265047"/>
             <a:ext cx="2292991" cy="307777"/>
           </a:xfrm>
           <a:prstGeom prst="rect">
@@ -6846,7 +6806,7 @@
         </p:nvSpPr>
         <p:spPr>
           <a:xfrm>
-            <a:off x="5376044" y="2197414"/>
+            <a:off x="5450246" y="2636024"/>
             <a:ext cx="896125" cy="369332"/>
           </a:xfrm>
           <a:prstGeom prst="rect">
@@ -7127,69 +7087,12 @@
           </a:p>
         </p:txBody>
       </p:sp>
-      <p:sp>
-        <p:nvSpPr>
-          <p:cNvPr id="21" name="Rounded Rectangle 20">
-            <a:extLst>
-              <a:ext uri="{FF2B5EF4-FFF2-40B4-BE49-F238E27FC236}">
-                <a16:creationId xmlns:a16="http://schemas.microsoft.com/office/drawing/2014/main" id="{07686512-B7B0-D74C-A69A-155006B57B37}"/>
-              </a:ext>
-            </a:extLst>
-          </p:cNvPr>
-          <p:cNvSpPr/>
-          <p:nvPr/>
-        </p:nvSpPr>
-        <p:spPr>
-          <a:xfrm>
-            <a:off x="500743" y="2260744"/>
-            <a:ext cx="1624268" cy="1777856"/>
-          </a:xfrm>
-          <a:prstGeom prst="roundRect">
-            <a:avLst/>
-          </a:prstGeom>
-          <a:solidFill>
-            <a:schemeClr val="accent4"/>
-          </a:solidFill>
-        </p:spPr>
-        <p:style>
-          <a:lnRef idx="2">
-            <a:schemeClr val="accent2">
-              <a:shade val="50000"/>
-            </a:schemeClr>
-          </a:lnRef>
-          <a:fillRef idx="1">
-            <a:schemeClr val="accent2"/>
-          </a:fillRef>
-          <a:effectRef idx="0">
-            <a:schemeClr val="accent2"/>
-          </a:effectRef>
-          <a:fontRef idx="minor">
-            <a:schemeClr val="lt1"/>
-          </a:fontRef>
-        </p:style>
-        <p:txBody>
-          <a:bodyPr rtlCol="0" anchor="ctr"/>
-          <a:lstStyle/>
-          <a:p>
-            <a:pPr algn="ctr"/>
-            <a:r>
-              <a:rPr lang="en-US" dirty="0"/>
-              <a:t>Return Sys out msg as on </a:t>
-            </a:r>
-            <a:r>
-              <a:rPr lang="en-US" dirty="0" err="1"/>
-              <a:t>index.jsp</a:t>
-            </a:r>
-            <a:endParaRPr lang="en-US" dirty="0"/>
-          </a:p>
-        </p:txBody>
-      </p:sp>
       <p:pic>
         <p:nvPicPr>
-          <p:cNvPr id="22" name="Graphic 21" descr="Warning with solid fill">
-            <a:extLst>
-              <a:ext uri="{FF2B5EF4-FFF2-40B4-BE49-F238E27FC236}">
-                <a16:creationId xmlns:a16="http://schemas.microsoft.com/office/drawing/2014/main" id="{25E032FF-EE9D-0C42-B9BF-61D7E3A1F928}"/>
+          <p:cNvPr id="23" name="Graphic 22" descr="Shield Tick with solid fill">
+            <a:extLst>
+              <a:ext uri="{FF2B5EF4-FFF2-40B4-BE49-F238E27FC236}">
+                <a16:creationId xmlns:a16="http://schemas.microsoft.com/office/drawing/2014/main" id="{DBDEBA48-668E-164E-87D8-98EE54F5CF8B}"/>
               </a:ext>
             </a:extLst>
           </p:cNvPr>
@@ -7212,7 +7115,7 @@
         </p:blipFill>
         <p:spPr>
           <a:xfrm>
-            <a:off x="11150367" y="2850449"/>
+            <a:off x="11277600" y="3005356"/>
             <a:ext cx="914400" cy="914400"/>
           </a:xfrm>
           <a:prstGeom prst="rect">
@@ -10787,7 +10690,7 @@
             <a:pPr algn="ctr"/>
             <a:r>
               <a:rPr lang="en-US" sz="1600" dirty="0" err="1"/>
-              <a:t>DllogServlet.java</a:t>
+              <a:t>DlogServlet.java</a:t>
             </a:r>
             <a:r>
               <a:rPr lang="en-US" sz="1600" dirty="0"/>
@@ -11317,7 +11220,7 @@
         </p:nvSpPr>
         <p:spPr>
           <a:xfrm>
-            <a:off x="5149602" y="3030352"/>
+            <a:off x="5209841" y="2975606"/>
             <a:ext cx="1572237" cy="307777"/>
           </a:xfrm>
           <a:prstGeom prst="rect">
@@ -11352,7 +11255,7 @@
         </p:nvSpPr>
         <p:spPr>
           <a:xfrm>
-            <a:off x="5149601" y="3558037"/>
+            <a:off x="5182356" y="3849616"/>
             <a:ext cx="1572237" cy="523220"/>
           </a:xfrm>
           <a:prstGeom prst="rect">
@@ -11395,7 +11298,7 @@
         </p:nvSpPr>
         <p:spPr>
           <a:xfrm>
-            <a:off x="5254507" y="3289894"/>
+            <a:off x="5182355" y="3584194"/>
             <a:ext cx="1572237" cy="307777"/>
           </a:xfrm>
           <a:prstGeom prst="rect">
@@ -11559,7 +11462,7 @@
         </p:nvSpPr>
         <p:spPr>
           <a:xfrm>
-            <a:off x="5445121" y="2535324"/>
+            <a:off x="5270287" y="2746255"/>
             <a:ext cx="876881" cy="307777"/>
           </a:xfrm>
           <a:prstGeom prst="rect">
@@ -11852,7 +11755,7 @@
         </p:nvSpPr>
         <p:spPr>
           <a:xfrm>
-            <a:off x="5359413" y="2782838"/>
+            <a:off x="5254506" y="2428171"/>
             <a:ext cx="1572237" cy="307777"/>
           </a:xfrm>
           <a:prstGeom prst="rect">
@@ -11868,7 +11771,7 @@
           <a:p>
             <a:r>
               <a:rPr lang="en-US" sz="1400" dirty="0"/>
-              <a:t>Address</a:t>
+              <a:t>Name</a:t>
             </a:r>
           </a:p>
         </p:txBody>
@@ -11954,6 +11857,41 @@
           <a:p>
             <a:pPr algn="ctr"/>
             <a:endParaRPr lang="en-US" dirty="0"/>
+          </a:p>
+        </p:txBody>
+      </p:sp>
+      <p:sp>
+        <p:nvSpPr>
+          <p:cNvPr id="29" name="TextBox 28">
+            <a:extLst>
+              <a:ext uri="{FF2B5EF4-FFF2-40B4-BE49-F238E27FC236}">
+                <a16:creationId xmlns:a16="http://schemas.microsoft.com/office/drawing/2014/main" id="{F6F23F94-4D73-8E47-9547-7CABBC93A265}"/>
+              </a:ext>
+            </a:extLst>
+          </p:cNvPr>
+          <p:cNvSpPr txBox="1"/>
+          <p:nvPr/>
+        </p:nvSpPr>
+        <p:spPr>
+          <a:xfrm>
+            <a:off x="5244268" y="3289925"/>
+            <a:ext cx="876881" cy="307777"/>
+          </a:xfrm>
+          <a:prstGeom prst="rect">
+            <a:avLst/>
+          </a:prstGeom>
+          <a:noFill/>
+        </p:spPr>
+        <p:txBody>
+          <a:bodyPr wrap="square" rtlCol="0">
+            <a:spAutoFit/>
+          </a:bodyPr>
+          <a:lstStyle/>
+          <a:p>
+            <a:r>
+              <a:rPr lang="en-US" sz="1400" dirty="0"/>
+              <a:t>Address</a:t>
+            </a:r>
           </a:p>
         </p:txBody>
       </p:sp>
@@ -12790,12 +12728,20 @@
           <a:lstStyle/>
           <a:p>
             <a:r>
+              <a:rPr lang="en-US" sz="1400" dirty="0" err="1">
+                <a:solidFill>
+                  <a:schemeClr val="accent3"/>
+                </a:solidFill>
+              </a:rPr>
+              <a:t>DoB</a:t>
+            </a:r>
+            <a:r>
               <a:rPr lang="en-US" sz="1400" dirty="0">
                 <a:solidFill>
                   <a:schemeClr val="accent3"/>
                 </a:solidFill>
               </a:rPr>
-              <a:t>Booking Date : 24/07/2020</a:t>
+              <a:t>: 24/07/1990</a:t>
             </a:r>
           </a:p>
         </p:txBody>
@@ -12958,10 +12904,10 @@
       </p:sp>
       <p:sp>
         <p:nvSpPr>
-          <p:cNvPr id="2" name="TextBox 1">
-            <a:extLst>
-              <a:ext uri="{FF2B5EF4-FFF2-40B4-BE49-F238E27FC236}">
-                <a16:creationId xmlns:a16="http://schemas.microsoft.com/office/drawing/2014/main" id="{1875F75D-AB56-4A48-8E52-5450C3FA3B7E}"/>
+          <p:cNvPr id="34" name="TextBox 33">
+            <a:extLst>
+              <a:ext uri="{FF2B5EF4-FFF2-40B4-BE49-F238E27FC236}">
+                <a16:creationId xmlns:a16="http://schemas.microsoft.com/office/drawing/2014/main" id="{2F486859-C5DF-8A4A-8621-D609A10C8393}"/>
               </a:ext>
             </a:extLst>
           </p:cNvPr>
@@ -12970,8 +12916,8 @@
         </p:nvSpPr>
         <p:spPr>
           <a:xfrm>
-            <a:off x="6830123" y="5624763"/>
-            <a:ext cx="3138644" cy="923330"/>
+            <a:off x="5154426" y="3072932"/>
+            <a:ext cx="1918334" cy="307777"/>
           </a:xfrm>
           <a:prstGeom prst="rect">
             <a:avLst/>
@@ -12985,45 +12931,6 @@
           <a:lstStyle/>
           <a:p>
             <a:r>
-              <a:rPr lang="en-US" dirty="0">
-                <a:solidFill>
-                  <a:srgbClr val="FF0000"/>
-                </a:solidFill>
-              </a:rPr>
-              <a:t>NB. Suggest Change DOB to Booking Date to get unique historical patient record</a:t>
-            </a:r>
-          </a:p>
-        </p:txBody>
-      </p:sp>
-      <p:sp>
-        <p:nvSpPr>
-          <p:cNvPr id="34" name="TextBox 33">
-            <a:extLst>
-              <a:ext uri="{FF2B5EF4-FFF2-40B4-BE49-F238E27FC236}">
-                <a16:creationId xmlns:a16="http://schemas.microsoft.com/office/drawing/2014/main" id="{2F486859-C5DF-8A4A-8621-D609A10C8393}"/>
-              </a:ext>
-            </a:extLst>
-          </p:cNvPr>
-          <p:cNvSpPr txBox="1"/>
-          <p:nvPr/>
-        </p:nvSpPr>
-        <p:spPr>
-          <a:xfrm>
-            <a:off x="5178760" y="3087925"/>
-            <a:ext cx="1918334" cy="307777"/>
-          </a:xfrm>
-          <a:prstGeom prst="rect">
-            <a:avLst/>
-          </a:prstGeom>
-          <a:noFill/>
-        </p:spPr>
-        <p:txBody>
-          <a:bodyPr wrap="square" rtlCol="0">
-            <a:spAutoFit/>
-          </a:bodyPr>
-          <a:lstStyle/>
-          <a:p>
-            <a:r>
               <a:rPr lang="en-US" sz="1400" dirty="0">
                 <a:solidFill>
                   <a:schemeClr val="accent3"/>
@@ -13031,6 +12938,82 @@
               </a:rPr>
               <a:t>Phone: 0671234567</a:t>
             </a:r>
+          </a:p>
+        </p:txBody>
+      </p:sp>
+      <p:sp>
+        <p:nvSpPr>
+          <p:cNvPr id="35" name="Rounded Rectangular Callout 34">
+            <a:extLst>
+              <a:ext uri="{FF2B5EF4-FFF2-40B4-BE49-F238E27FC236}">
+                <a16:creationId xmlns:a16="http://schemas.microsoft.com/office/drawing/2014/main" id="{092186C4-3C15-0D46-9DEA-76F76D26F279}"/>
+              </a:ext>
+            </a:extLst>
+          </p:cNvPr>
+          <p:cNvSpPr/>
+          <p:nvPr/>
+        </p:nvSpPr>
+        <p:spPr>
+          <a:xfrm>
+            <a:off x="3991474" y="5452426"/>
+            <a:ext cx="4709794" cy="1102479"/>
+          </a:xfrm>
+          <a:prstGeom prst="wedgeRoundRectCallout">
+            <a:avLst>
+              <a:gd name="adj1" fmla="val -27669"/>
+              <a:gd name="adj2" fmla="val -100354"/>
+              <a:gd name="adj3" fmla="val 16667"/>
+            </a:avLst>
+          </a:prstGeom>
+        </p:spPr>
+        <p:style>
+          <a:lnRef idx="0">
+            <a:schemeClr val="accent4"/>
+          </a:lnRef>
+          <a:fillRef idx="3">
+            <a:schemeClr val="accent4"/>
+          </a:fillRef>
+          <a:effectRef idx="3">
+            <a:schemeClr val="accent4"/>
+          </a:effectRef>
+          <a:fontRef idx="minor">
+            <a:schemeClr val="lt1"/>
+          </a:fontRef>
+        </p:style>
+        <p:txBody>
+          <a:bodyPr rtlCol="0" anchor="ctr"/>
+          <a:lstStyle/>
+          <a:p>
+            <a:pPr algn="ctr"/>
+            <a:r>
+              <a:rPr lang="en-US" dirty="0"/>
+              <a:t>Onclick write </a:t>
+            </a:r>
+            <a:r>
+              <a:rPr lang="en-US" dirty="0" err="1"/>
+              <a:t>sout</a:t>
+            </a:r>
+            <a:r>
+              <a:rPr lang="en-US" dirty="0"/>
+              <a:t> to save to </a:t>
+            </a:r>
+            <a:r>
+              <a:rPr lang="en-US" dirty="0" err="1"/>
+              <a:t>record.java</a:t>
+            </a:r>
+            <a:r>
+              <a:rPr lang="en-US" dirty="0"/>
+              <a:t>. If not ok, return to </a:t>
+            </a:r>
+            <a:r>
+              <a:rPr lang="en-US" dirty="0" err="1"/>
+              <a:t>bookings.jsp</a:t>
+            </a:r>
+            <a:endParaRPr lang="en-US" dirty="0"/>
+          </a:p>
+          <a:p>
+            <a:pPr algn="ctr"/>
+            <a:endParaRPr lang="en-US" dirty="0"/>
           </a:p>
         </p:txBody>
       </p:sp>

</xml_diff>